<commit_message>
Add Post Meeting Checkpoint
</commit_message>
<xml_diff>
--- a/28_05_slides.pptx
+++ b/28_05_slides.pptx
@@ -111,6 +111,11 @@
       </a:defRPr>
     </a:lvl9pPr>
   </p:defaultTextStyle>
+  <p:extLst>
+    <p:ext uri="{EFAFB233-063F-42B5-8137-9DF3F51BA10A}">
+      <p15:sldGuideLst xmlns:p15="http://schemas.microsoft.com/office/powerpoint/2012/main"/>
+    </p:ext>
+  </p:extLst>
 </p:presentation>
 </file>
 
@@ -4805,8 +4810,8 @@
           <a:lstStyle/>
           <a:p>
             <a:r>
-              <a:rPr lang="de-DE" sz="2400" b="1" dirty="0" err="1"/>
-              <a:t>GESIS</a:t>
+              <a:rPr lang="de-DE" sz="2400" b="1" dirty="0"/>
+              <a:t>Allensbach</a:t>
             </a:r>
             <a:r>
               <a:rPr lang="de-DE" sz="2400" dirty="0"/>
@@ -4943,7 +4948,7 @@
           <a:p>
             <a:r>
               <a:rPr lang="de-DE" sz="2400" b="1" dirty="0" err="1"/>
-              <a:t>GBS</a:t>
+              <a:t>GESIS</a:t>
             </a:r>
             <a:r>
               <a:rPr lang="de-DE" sz="2400" dirty="0"/>

</xml_diff>